<commit_message>
Slides: add detailed 'How it works' second slide to each deck
</commit_message>
<xml_diff>
--- a/Adaptive Right-Sizing/overview.pptx
+++ b/Adaptive Right-Sizing/overview.pptx
@@ -6,6 +6,7 @@
   </p:sldMasterIdLst>
   <p:sldIdLst>
     <p:sldId id="256" r:id="rId7"/>
+    <p:sldId id="257" r:id="rId8"/>
   </p:sldIdLst>
   <p:sldSz cx="9144000" cy="6858000" type="screen4x3"/>
   <p:notesSz cx="6858000" cy="9144000"/>
@@ -3149,6 +3150,89 @@
             <a:r>
               <a:rPr sz="1800"/>
               <a:t>Seed script generates bursty workload to trigger scaling</a:t>
+            </a:r>
+          </a:p>
+        </p:txBody>
+      </p:sp>
+    </p:spTree>
+  </p:cSld>
+  <p:clrMapOvr>
+    <a:masterClrMapping/>
+  </p:clrMapOvr>
+</p:sld>
+</file>
+
+<file path=ppt/slides/slide2.xml><?xml version="1.0" encoding="utf-8"?>
+<p:sld xmlns:a="http://schemas.openxmlformats.org/drawingml/2006/main" xmlns:p="http://schemas.openxmlformats.org/presentationml/2006/main" xmlns:r="http://schemas.openxmlformats.org/officeDocument/2006/relationships">
+  <p:cSld>
+    <p:spTree>
+      <p:nvGrpSpPr>
+        <p:cNvPr id="1" name=""/>
+        <p:cNvGrpSpPr/>
+        <p:nvPr/>
+      </p:nvGrpSpPr>
+      <p:grpSpPr/>
+      <p:sp>
+        <p:nvSpPr>
+          <p:cNvPr id="2" name="Title 1"/>
+          <p:cNvSpPr>
+            <a:spLocks noGrp="1"/>
+          </p:cNvSpPr>
+          <p:nvPr>
+            <p:ph type="title"/>
+          </p:nvPr>
+        </p:nvSpPr>
+        <p:spPr/>
+        <p:txBody>
+          <a:bodyPr/>
+          <a:lstStyle/>
+          <a:p>
+            <a:r>
+              <a:t>How it works</a:t>
+            </a:r>
+          </a:p>
+        </p:txBody>
+      </p:sp>
+      <p:sp>
+        <p:nvSpPr>
+          <p:cNvPr id="3" name="Content Placeholder 2"/>
+          <p:cNvSpPr>
+            <a:spLocks noGrp="1"/>
+          </p:cNvSpPr>
+          <p:nvPr>
+            <p:ph idx="1"/>
+          </p:nvPr>
+        </p:nvSpPr>
+        <p:spPr/>
+        <p:txBody>
+          <a:bodyPr/>
+          <a:lstStyle/>
+          <a:p>
+            <a:pPr/>
+            <a:r>
+              <a:rPr sz="1800"/>
+              <a:t>Stage metering → TECHUP.AUDIT.WAREHOUSE_METERING_STG (task)</a:t>
+            </a:r>
+          </a:p>
+          <a:p>
+            <a:pPr/>
+            <a:r>
+              <a:rPr sz="1800"/>
+              <a:t>RIGHT_SIZING_POLICY_DT: avg(credits_used) per warehouse/hour</a:t>
+            </a:r>
+          </a:p>
+          <a:p>
+            <a:pPr/>
+            <a:r>
+              <a:rPr sz="1800"/>
+              <a:t>APPLY_RIGHT_SIZING(): ALTER WAREHOUSE size + optional multi-cluster</a:t>
+            </a:r>
+          </a:p>
+          <a:p>
+            <a:pPr/>
+            <a:r>
+              <a:rPr sz="1800"/>
+              <a:t>APPLY_RIGHT_SIZING_TASK: runs hourly; logs actions to RIGHT_SIZING_LOG</a:t>
             </a:r>
           </a:p>
         </p:txBody>

</xml_diff>

<commit_message>
Slides: enrich Adaptive Right-Sizing deck with deeper how-it-works details
</commit_message>
<xml_diff>
--- a/Adaptive Right-Sizing/overview.pptx
+++ b/Adaptive Right-Sizing/overview.pptx
@@ -3128,28 +3128,28 @@
             <a:pPr/>
             <a:r>
               <a:rPr sz="1800"/>
-              <a:t>Computes hour-by-hour sizing policy from metering (credits_used)</a:t>
+              <a:t>Goal: auto-tune warehouse size by observed load patterns</a:t>
             </a:r>
           </a:p>
           <a:p>
             <a:pPr/>
             <a:r>
               <a:rPr sz="1800"/>
-              <a:t>Dynamic Table: RIGHT_SIZING_POLICY_DT</a:t>
+              <a:t>Inputs: staged WAREHOUSE_METERING (credits_used by hour)</a:t>
             </a:r>
           </a:p>
           <a:p>
             <a:pPr/>
             <a:r>
               <a:rPr sz="1800"/>
-              <a:t>Executor: APPLY_RIGHT_SIZING() + scheduled task</a:t>
+              <a:t>Policy DT: RIGHT_SIZING_POLICY_DT → per-warehouse/hour recommendation</a:t>
             </a:r>
           </a:p>
           <a:p>
             <a:pPr/>
             <a:r>
               <a:rPr sz="1800"/>
-              <a:t>Seed script generates bursty workload to trigger scaling</a:t>
+              <a:t>Executor: APPLY_RIGHT_SIZING() applies size + optional multi-cluster</a:t>
             </a:r>
           </a:p>
         </p:txBody>
@@ -3211,28 +3211,42 @@
             <a:pPr/>
             <a:r>
               <a:rPr sz="1800"/>
-              <a:t>Stage metering → TECHUP.AUDIT.WAREHOUSE_METERING_STG (task)</a:t>
+              <a:t>Ingestion: Task merges ACCOUNT_USAGE.WAREHOUSE_METERING → TECHUP.AUDIT.WAREHOUSE_METERING_STG (change tracking)</a:t>
             </a:r>
           </a:p>
           <a:p>
             <a:pPr/>
             <a:r>
               <a:rPr sz="1800"/>
-              <a:t>RIGHT_SIZING_POLICY_DT: avg(credits_used) per warehouse/hour</a:t>
+              <a:t>Signal: Aggregate credits_used into hourly buckets per warehouse</a:t>
             </a:r>
           </a:p>
           <a:p>
             <a:pPr/>
             <a:r>
               <a:rPr sz="1800"/>
-              <a:t>APPLY_RIGHT_SIZING(): ALTER WAREHOUSE size + optional multi-cluster</a:t>
+              <a:t>Policy logic: map avg(credits_used) ranges → SMALL/MEDIUM/LARGE sizing and multi-cluster toggle</a:t>
             </a:r>
           </a:p>
           <a:p>
             <a:pPr/>
             <a:r>
               <a:rPr sz="1800"/>
-              <a:t>APPLY_RIGHT_SIZING_TASK: runs hourly; logs actions to RIGHT_SIZING_LOG</a:t>
+              <a:t>Governance: all changes logged in RIGHT_SIZING_LOG with status, DDL, error</a:t>
+            </a:r>
+          </a:p>
+          <a:p>
+            <a:pPr/>
+            <a:r>
+              <a:rPr sz="1800"/>
+              <a:t>Orchestration: APPLY_RIGHT_SIZING_TASK executes on-the-hour against current hour recommendation</a:t>
+            </a:r>
+          </a:p>
+          <a:p>
+            <a:pPr/>
+            <a:r>
+              <a:rPr sz="1800"/>
+              <a:t>Safety: thresholds are conservative; tune sizing cutoffs per environment; dry-run by commenting execute immediate</a:t>
             </a:r>
           </a:p>
         </p:txBody>

</xml_diff>

<commit_message>
Slides: compress Adaptive Right-Sizing to 3 concise bullets; remove details slide
</commit_message>
<xml_diff>
--- a/Adaptive Right-Sizing/overview.pptx
+++ b/Adaptive Right-Sizing/overview.pptx
@@ -6,7 +6,6 @@
   </p:sldMasterIdLst>
   <p:sldIdLst>
     <p:sldId id="256" r:id="rId7"/>
-    <p:sldId id="257" r:id="rId8"/>
   </p:sldIdLst>
   <p:sldSz cx="9144000" cy="6858000" type="screen4x3"/>
   <p:notesSz cx="6858000" cy="9144000"/>
@@ -3128,125 +3127,21 @@
             <a:pPr/>
             <a:r>
               <a:rPr sz="1800"/>
-              <a:t>Goal: auto-tune warehouse size by observed load patterns</a:t>
+              <a:t>Auto-rightsizes warehouses by hourly load</a:t>
             </a:r>
           </a:p>
           <a:p>
             <a:pPr/>
             <a:r>
               <a:rPr sz="1800"/>
-              <a:t>Inputs: staged WAREHOUSE_METERING (credits_used by hour)</a:t>
+              <a:t>Policy DT derives size from credits_used</a:t>
             </a:r>
           </a:p>
           <a:p>
             <a:pPr/>
             <a:r>
               <a:rPr sz="1800"/>
-              <a:t>Policy DT: RIGHT_SIZING_POLICY_DT → per-warehouse/hour recommendation</a:t>
-            </a:r>
-          </a:p>
-          <a:p>
-            <a:pPr/>
-            <a:r>
-              <a:rPr sz="1800"/>
-              <a:t>Executor: APPLY_RIGHT_SIZING() applies size + optional multi-cluster</a:t>
-            </a:r>
-          </a:p>
-        </p:txBody>
-      </p:sp>
-    </p:spTree>
-  </p:cSld>
-  <p:clrMapOvr>
-    <a:masterClrMapping/>
-  </p:clrMapOvr>
-</p:sld>
-</file>
-
-<file path=ppt/slides/slide2.xml><?xml version="1.0" encoding="utf-8"?>
-<p:sld xmlns:a="http://schemas.openxmlformats.org/drawingml/2006/main" xmlns:p="http://schemas.openxmlformats.org/presentationml/2006/main" xmlns:r="http://schemas.openxmlformats.org/officeDocument/2006/relationships">
-  <p:cSld>
-    <p:spTree>
-      <p:nvGrpSpPr>
-        <p:cNvPr id="1" name=""/>
-        <p:cNvGrpSpPr/>
-        <p:nvPr/>
-      </p:nvGrpSpPr>
-      <p:grpSpPr/>
-      <p:sp>
-        <p:nvSpPr>
-          <p:cNvPr id="2" name="Title 1"/>
-          <p:cNvSpPr>
-            <a:spLocks noGrp="1"/>
-          </p:cNvSpPr>
-          <p:nvPr>
-            <p:ph type="title"/>
-          </p:nvPr>
-        </p:nvSpPr>
-        <p:spPr/>
-        <p:txBody>
-          <a:bodyPr/>
-          <a:lstStyle/>
-          <a:p>
-            <a:r>
-              <a:t>How it works</a:t>
-            </a:r>
-          </a:p>
-        </p:txBody>
-      </p:sp>
-      <p:sp>
-        <p:nvSpPr>
-          <p:cNvPr id="3" name="Content Placeholder 2"/>
-          <p:cNvSpPr>
-            <a:spLocks noGrp="1"/>
-          </p:cNvSpPr>
-          <p:nvPr>
-            <p:ph idx="1"/>
-          </p:nvPr>
-        </p:nvSpPr>
-        <p:spPr/>
-        <p:txBody>
-          <a:bodyPr/>
-          <a:lstStyle/>
-          <a:p>
-            <a:pPr/>
-            <a:r>
-              <a:rPr sz="1800"/>
-              <a:t>Ingestion: Task merges ACCOUNT_USAGE.WAREHOUSE_METERING → TECHUP.AUDIT.WAREHOUSE_METERING_STG (change tracking)</a:t>
-            </a:r>
-          </a:p>
-          <a:p>
-            <a:pPr/>
-            <a:r>
-              <a:rPr sz="1800"/>
-              <a:t>Signal: Aggregate credits_used into hourly buckets per warehouse</a:t>
-            </a:r>
-          </a:p>
-          <a:p>
-            <a:pPr/>
-            <a:r>
-              <a:rPr sz="1800"/>
-              <a:t>Policy logic: map avg(credits_used) ranges → SMALL/MEDIUM/LARGE sizing and multi-cluster toggle</a:t>
-            </a:r>
-          </a:p>
-          <a:p>
-            <a:pPr/>
-            <a:r>
-              <a:rPr sz="1800"/>
-              <a:t>Governance: all changes logged in RIGHT_SIZING_LOG with status, DDL, error</a:t>
-            </a:r>
-          </a:p>
-          <a:p>
-            <a:pPr/>
-            <a:r>
-              <a:rPr sz="1800"/>
-              <a:t>Orchestration: APPLY_RIGHT_SIZING_TASK executes on-the-hour against current hour recommendation</a:t>
-            </a:r>
-          </a:p>
-          <a:p>
-            <a:pPr/>
-            <a:r>
-              <a:rPr sz="1800"/>
-              <a:t>Safety: thresholds are conservative; tune sizing cutoffs per environment; dry-run by commenting execute immediate</a:t>
+              <a:t>Executor task applies changes and logs</a:t>
             </a:r>
           </a:p>
         </p:txBody>

</xml_diff>